<commit_message>
docs: add slides for sessions 7-10
</commit_message>
<xml_diff>
--- a/slides/00-intro.pptx
+++ b/slides/00-intro.pptx
@@ -1160,7 +1160,7 @@
           <a:p>
             <a:fld id="{855B53BB-9CA8-4E36-AA7C-C10D869BF69A}" type="datetimeFigureOut">
               <a:rPr lang="en-US" smtClean="0"/>
-              <a:t>9/27/24</a:t>
+              <a:t>9/30/24</a:t>
             </a:fld>
             <a:endParaRPr lang="en-US"/>
           </a:p>
@@ -1788,7 +1788,7 @@
                 <a:tabLst/>
                 <a:defRPr/>
               </a:pPr>
-              <a:t>9/27/24 3:03 PM</a:t>
+              <a:t>9/30/24 2:16 PM</a:t>
             </a:fld>
             <a:endParaRPr kumimoji="0" lang="en-US" sz="1200" b="0" i="0" u="none" strike="noStrike" kern="1200" cap="none" spc="0" normalizeH="0" baseline="0" noProof="0" dirty="0">
               <a:ln>
@@ -2178,7 +2178,7 @@
                 <a:tabLst/>
                 <a:defRPr/>
               </a:pPr>
-              <a:t>9/27/24 3:03 PM</a:t>
+              <a:t>9/30/24 2:16 PM</a:t>
             </a:fld>
             <a:endParaRPr kumimoji="0" lang="en-US" sz="1200" b="0" i="0" u="none" strike="noStrike" kern="1200" cap="none" spc="0" normalizeH="0" baseline="0" noProof="0" dirty="0">
               <a:ln>
@@ -2674,8 +2674,12 @@
           </a:p>
           <a:p>
             <a:r>
+              <a:rPr lang="en-GB" i="1"/>
+              <a:t>Next session, </a:t>
+            </a:r>
+            <a:r>
               <a:rPr lang="en-GB" i="1" dirty="0"/>
-              <a:t>Next video, we’ll start with </a:t>
+              <a:t>we’ll start with </a:t>
             </a:r>
             <a:r>
               <a:rPr lang="en-FR" i="1" dirty="0"/>

</xml_diff>